<commit_message>
drobné úpravy 5. cvičení
</commit_message>
<xml_diff>
--- a/05-strukturovana-data/cviceni-05.pptx
+++ b/05-strukturovana-data/cviceni-05.pptx
@@ -854,7 +854,7 @@
             <a:fld id="{5586B75A-687E-405C-8A0B-8D00578BA2C3}" type="datetimeFigureOut">
               <a:rPr lang="en-US" smtClean="0"/>
               <a:pPr/>
-              <a:t>3/18/2021</a:t>
+              <a:t>10/17/2022</a:t>
             </a:fld>
             <a:endParaRPr lang="en-US" dirty="0"/>
           </a:p>
@@ -1107,7 +1107,7 @@
             <a:fld id="{5586B75A-687E-405C-8A0B-8D00578BA2C3}" type="datetimeFigureOut">
               <a:rPr lang="en-US" smtClean="0"/>
               <a:pPr/>
-              <a:t>3/18/2021</a:t>
+              <a:t>10/17/2022</a:t>
             </a:fld>
             <a:endParaRPr lang="en-US" dirty="0"/>
           </a:p>
@@ -1424,7 +1424,7 @@
             <a:fld id="{5586B75A-687E-405C-8A0B-8D00578BA2C3}" type="datetimeFigureOut">
               <a:rPr lang="en-US" smtClean="0"/>
               <a:pPr/>
-              <a:t>3/18/2021</a:t>
+              <a:t>10/17/2022</a:t>
             </a:fld>
             <a:endParaRPr lang="en-US" dirty="0"/>
           </a:p>
@@ -1754,7 +1754,7 @@
             <a:fld id="{5586B75A-687E-405C-8A0B-8D00578BA2C3}" type="datetimeFigureOut">
               <a:rPr lang="en-US" smtClean="0"/>
               <a:pPr/>
-              <a:t>3/18/2021</a:t>
+              <a:t>10/17/2022</a:t>
             </a:fld>
             <a:endParaRPr lang="en-US" dirty="0"/>
           </a:p>
@@ -2071,7 +2071,7 @@
             <a:fld id="{5586B75A-687E-405C-8A0B-8D00578BA2C3}" type="datetimeFigureOut">
               <a:rPr lang="en-US" smtClean="0"/>
               <a:pPr/>
-              <a:t>3/18/2021</a:t>
+              <a:t>10/17/2022</a:t>
             </a:fld>
             <a:endParaRPr lang="en-US" dirty="0"/>
           </a:p>
@@ -2461,7 +2461,7 @@
             <a:fld id="{5586B75A-687E-405C-8A0B-8D00578BA2C3}" type="datetimeFigureOut">
               <a:rPr lang="en-US" smtClean="0"/>
               <a:pPr/>
-              <a:t>3/18/2021</a:t>
+              <a:t>10/17/2022</a:t>
             </a:fld>
             <a:endParaRPr lang="en-US" dirty="0"/>
           </a:p>
@@ -2633,7 +2633,7 @@
           <a:p>
             <a:fld id="{5F4E5243-F52A-4D37-9694-EB26C6C31910}" type="datetimeFigureOut">
               <a:rPr lang="en-US" smtClean="0"/>
-              <a:t>3/18/2021</a:t>
+              <a:t>10/17/2022</a:t>
             </a:fld>
             <a:endParaRPr lang="en-US" dirty="0"/>
           </a:p>
@@ -2813,7 +2813,7 @@
           <a:p>
             <a:fld id="{3A77B6E1-634A-48DC-9E8B-D894023267EF}" type="datetimeFigureOut">
               <a:rPr lang="en-US" smtClean="0"/>
-              <a:t>3/18/2021</a:t>
+              <a:t>10/17/2022</a:t>
             </a:fld>
             <a:endParaRPr lang="en-US" dirty="0"/>
           </a:p>
@@ -2989,7 +2989,7 @@
           <a:p>
             <a:fld id="{7B2D3E9E-A95C-48F2-B4BF-A71542E0BE9A}" type="datetimeFigureOut">
               <a:rPr lang="en-US" smtClean="0"/>
-              <a:t>3/18/2021</a:t>
+              <a:t>10/17/2022</a:t>
             </a:fld>
             <a:endParaRPr lang="en-US" dirty="0"/>
           </a:p>
@@ -3237,7 +3237,7 @@
             <a:fld id="{5586B75A-687E-405C-8A0B-8D00578BA2C3}" type="datetimeFigureOut">
               <a:rPr lang="en-US" smtClean="0"/>
               <a:pPr/>
-              <a:t>3/18/2021</a:t>
+              <a:t>10/17/2022</a:t>
             </a:fld>
             <a:endParaRPr lang="en-US" dirty="0"/>
           </a:p>
@@ -3470,7 +3470,7 @@
           <a:p>
             <a:fld id="{F12952B5-7A2F-4CC8-B7CE-9234E21C2837}" type="datetimeFigureOut">
               <a:rPr lang="en-US" smtClean="0"/>
-              <a:t>3/18/2021</a:t>
+              <a:t>10/17/2022</a:t>
             </a:fld>
             <a:endParaRPr lang="en-US" dirty="0"/>
           </a:p>
@@ -3844,7 +3844,7 @@
           <a:p>
             <a:fld id="{CE1DA07A-9201-4B4B-BAF2-015AFA30F520}" type="datetimeFigureOut">
               <a:rPr lang="en-US" smtClean="0"/>
-              <a:t>3/18/2021</a:t>
+              <a:t>10/17/2022</a:t>
             </a:fld>
             <a:endParaRPr lang="en-US" dirty="0"/>
           </a:p>
@@ -3967,7 +3967,7 @@
           <a:p>
             <a:fld id="{73D7E00A-486F-4252-8B1D-E32645521F49}" type="datetimeFigureOut">
               <a:rPr lang="en-US" smtClean="0"/>
-              <a:t>3/18/2021</a:t>
+              <a:t>10/17/2022</a:t>
             </a:fld>
             <a:endParaRPr lang="en-US" dirty="0"/>
           </a:p>
@@ -4062,7 +4062,7 @@
           <a:p>
             <a:fld id="{8DDF5F92-E675-4B36-9A60-69A962A68675}" type="datetimeFigureOut">
               <a:rPr lang="en-US" smtClean="0"/>
-              <a:t>3/18/2021</a:t>
+              <a:t>10/17/2022</a:t>
             </a:fld>
             <a:endParaRPr lang="en-US" dirty="0"/>
           </a:p>
@@ -4317,7 +4317,7 @@
           <a:p>
             <a:fld id="{AF6E2C9B-5FA2-460D-9BE7-B0812FC2A6FF}" type="datetimeFigureOut">
               <a:rPr lang="en-US" smtClean="0"/>
-              <a:t>3/18/2021</a:t>
+              <a:t>10/17/2022</a:t>
             </a:fld>
             <a:endParaRPr lang="en-US" dirty="0"/>
           </a:p>
@@ -4582,7 +4582,7 @@
             <a:fld id="{5586B75A-687E-405C-8A0B-8D00578BA2C3}" type="datetimeFigureOut">
               <a:rPr lang="en-US" smtClean="0"/>
               <a:pPr/>
-              <a:t>3/18/2021</a:t>
+              <a:t>10/17/2022</a:t>
             </a:fld>
             <a:endParaRPr lang="en-US" dirty="0"/>
           </a:p>
@@ -5329,7 +5329,7 @@
             <a:fld id="{5586B75A-687E-405C-8A0B-8D00578BA2C3}" type="datetimeFigureOut">
               <a:rPr lang="en-US" smtClean="0"/>
               <a:pPr/>
-              <a:t>3/18/2021</a:t>
+              <a:t>10/17/2022</a:t>
             </a:fld>
             <a:endParaRPr lang="en-US" dirty="0"/>
           </a:p>
@@ -7812,12 +7812,47 @@
               <a:t>ůže</a:t>
             </a:r>
             <a:r>
-              <a:rPr lang="cs-CZ">
+              <a:rPr lang="cs-CZ" dirty="0">
                 <a:solidFill>
                   <a:schemeClr val="tx1"/>
                 </a:solidFill>
               </a:rPr>
               <a:t> běžet i na serveru </a:t>
+            </a:r>
+          </a:p>
+          <a:p>
+            <a:pPr lvl="1"/>
+            <a:r>
+              <a:rPr lang="cs-CZ" dirty="0">
+                <a:solidFill>
+                  <a:schemeClr val="tx1"/>
+                </a:solidFill>
+              </a:rPr>
+              <a:t>Do HTML stránky jej vkládáme pomocí značky </a:t>
+            </a:r>
+            <a:r>
+              <a:rPr lang="en-US" dirty="0">
+                <a:solidFill>
+                  <a:schemeClr val="tx1"/>
+                </a:solidFill>
+              </a:rPr>
+              <a:t>&lt;</a:t>
+            </a:r>
+            <a:r>
+              <a:rPr lang="cs-CZ" dirty="0">
+                <a:solidFill>
+                  <a:schemeClr val="tx1"/>
+                </a:solidFill>
+              </a:rPr>
+              <a:t>script</a:t>
+            </a:r>
+            <a:r>
+              <a:rPr lang="en-US" dirty="0">
+                <a:solidFill>
+                  <a:schemeClr val="tx1"/>
+                </a:solidFill>
+              </a:rPr>
+              <a:t>&gt;</a:t>
             </a:r>
             <a:endParaRPr lang="cs-CZ" dirty="0">
               <a:solidFill>
@@ -7826,46 +7861,6 @@
             </a:endParaRPr>
           </a:p>
           <a:p>
-            <a:pPr lvl="1"/>
-            <a:r>
-              <a:rPr lang="cs-CZ" dirty="0">
-                <a:solidFill>
-                  <a:schemeClr val="tx1"/>
-                </a:solidFill>
-              </a:rPr>
-              <a:t>Do HTML stránky jej vkládáme pomocí značky </a:t>
-            </a:r>
-            <a:r>
-              <a:rPr lang="en-US" dirty="0">
-                <a:solidFill>
-                  <a:schemeClr val="tx1"/>
-                </a:solidFill>
-              </a:rPr>
-              <a:t>&lt;</a:t>
-            </a:r>
-            <a:r>
-              <a:rPr lang="cs-CZ" dirty="0">
-                <a:solidFill>
-                  <a:schemeClr val="tx1"/>
-                </a:solidFill>
-              </a:rPr>
-              <a:t>script</a:t>
-            </a:r>
-            <a:r>
-              <a:rPr lang="en-US" dirty="0">
-                <a:solidFill>
-                  <a:schemeClr val="tx1"/>
-                </a:solidFill>
-              </a:rPr>
-              <a:t>&gt;</a:t>
-            </a:r>
-            <a:endParaRPr lang="cs-CZ" dirty="0">
-              <a:solidFill>
-                <a:schemeClr val="tx1"/>
-              </a:solidFill>
-            </a:endParaRPr>
-          </a:p>
-          <a:p>
             <a:endParaRPr lang="cs-CZ" dirty="0">
               <a:solidFill>
                 <a:srgbClr val="FFC000"/>
@@ -7879,7 +7874,23 @@
                   <a:srgbClr val="FFC000"/>
                 </a:solidFill>
               </a:rPr>
-              <a:t>V rámci domácího úkolu jste si měli projít příklad týkající se </a:t>
+              <a:t>Pojďme se společně podívat na příklad s </a:t>
+            </a:r>
+            <a:r>
+              <a:rPr lang="cs-CZ" i="1" dirty="0" err="1">
+                <a:solidFill>
+                  <a:srgbClr val="FFC000"/>
+                </a:solidFill>
+              </a:rPr>
+              <a:t>JavaScriptem</a:t>
+            </a:r>
+            <a:r>
+              <a:rPr lang="cs-CZ" i="1" dirty="0">
+                <a:solidFill>
+                  <a:srgbClr val="FFC000"/>
+                </a:solidFill>
+              </a:rPr>
+              <a:t>, respektive </a:t>
             </a:r>
             <a:r>
               <a:rPr lang="cs-CZ" i="1" dirty="0" err="1">
@@ -7889,25 +7900,11 @@
               </a:rPr>
               <a:t>jQuery</a:t>
             </a:r>
-            <a:r>
-              <a:rPr lang="cs-CZ" i="1" dirty="0">
-                <a:solidFill>
-                  <a:srgbClr val="FFC000"/>
-                </a:solidFill>
-              </a:rPr>
-              <a:t>.</a:t>
-            </a:r>
-          </a:p>
-          <a:p>
-            <a:pPr lvl="1"/>
-            <a:r>
-              <a:rPr lang="cs-CZ" i="1" dirty="0">
-                <a:solidFill>
-                  <a:srgbClr val="FFC000"/>
-                </a:solidFill>
-              </a:rPr>
-              <a:t>=&gt; Pojďme se na něj podívat společně…</a:t>
-            </a:r>
+            <a:endParaRPr lang="cs-CZ" i="1" dirty="0">
+              <a:solidFill>
+                <a:srgbClr val="FFC000"/>
+              </a:solidFill>
+            </a:endParaRPr>
           </a:p>
           <a:p>
             <a:pPr lvl="1"/>

</xml_diff>